<commit_message>
update Notes of curve and surface integral
</commit_message>
<xml_diff>
--- a/content/posts/Miscellanea/integral/images/曲线曲面示意图.pptx
+++ b/content/posts/Miscellanea/integral/images/曲线曲面示意图.pptx
@@ -6,8 +6,9 @@
   </p:sldMasterIdLst>
   <p:sldIdLst>
     <p:sldId id="257" r:id="rId2"/>
-    <p:sldId id="256" r:id="rId3"/>
-    <p:sldId id="258" r:id="rId4"/>
+    <p:sldId id="259" r:id="rId3"/>
+    <p:sldId id="256" r:id="rId4"/>
+    <p:sldId id="258" r:id="rId5"/>
   </p:sldIdLst>
   <p:sldSz cx="12192000" cy="6858000"/>
   <p:notesSz cx="6858000" cy="9144000"/>
@@ -4850,6 +4851,7 @@
             </a:extLst>
           </p:cNvPr>
           <p:cNvCxnSpPr>
+            <a:cxnSpLocks/>
             <a:endCxn id="42" idx="2"/>
           </p:cNvCxnSpPr>
           <p:nvPr/>
@@ -4875,86 +4877,6 @@
           </a:fillRef>
           <a:effectRef idx="0">
             <a:schemeClr val="dk1"/>
-          </a:effectRef>
-          <a:fontRef idx="minor">
-            <a:schemeClr val="tx1"/>
-          </a:fontRef>
-        </p:style>
-      </p:cxnSp>
-      <p:cxnSp>
-        <p:nvCxnSpPr>
-          <p:cNvPr id="96" name="Straight Arrow Connector 95">
-            <a:extLst>
-              <a:ext uri="{FF2B5EF4-FFF2-40B4-BE49-F238E27FC236}">
-                <a16:creationId xmlns:a16="http://schemas.microsoft.com/office/drawing/2014/main" id="{56DE5AB7-B3A3-497E-9284-1AE20AEF9C0C}"/>
-              </a:ext>
-            </a:extLst>
-          </p:cNvPr>
-          <p:cNvCxnSpPr>
-            <a:stCxn id="42" idx="1"/>
-            <a:endCxn id="42" idx="2"/>
-          </p:cNvCxnSpPr>
-          <p:nvPr/>
-        </p:nvCxnSpPr>
-        <p:spPr>
-          <a:xfrm flipV="1">
-            <a:off x="6159260" y="1475117"/>
-            <a:ext cx="500332" cy="250166"/>
-          </a:xfrm>
-          <a:prstGeom prst="straightConnector1">
-            <a:avLst/>
-          </a:prstGeom>
-          <a:ln>
-            <a:tailEnd type="triangle"/>
-          </a:ln>
-        </p:spPr>
-        <p:style>
-          <a:lnRef idx="2">
-            <a:schemeClr val="accent1"/>
-          </a:lnRef>
-          <a:fillRef idx="0">
-            <a:schemeClr val="accent1"/>
-          </a:fillRef>
-          <a:effectRef idx="1">
-            <a:schemeClr val="accent1"/>
-          </a:effectRef>
-          <a:fontRef idx="minor">
-            <a:schemeClr val="tx1"/>
-          </a:fontRef>
-        </p:style>
-      </p:cxnSp>
-      <p:cxnSp>
-        <p:nvCxnSpPr>
-          <p:cNvPr id="103" name="Straight Connector 102">
-            <a:extLst>
-              <a:ext uri="{FF2B5EF4-FFF2-40B4-BE49-F238E27FC236}">
-                <a16:creationId xmlns:a16="http://schemas.microsoft.com/office/drawing/2014/main" id="{F633FC40-46F6-4BFE-88BC-A3E84F709448}"/>
-              </a:ext>
-            </a:extLst>
-          </p:cNvPr>
-          <p:cNvCxnSpPr>
-            <a:cxnSpLocks/>
-          </p:cNvCxnSpPr>
-          <p:nvPr/>
-        </p:nvCxnSpPr>
-        <p:spPr>
-          <a:xfrm>
-            <a:off x="2295065" y="2424023"/>
-            <a:ext cx="445662" cy="0"/>
-          </a:xfrm>
-          <a:prstGeom prst="line">
-            <a:avLst/>
-          </a:prstGeom>
-        </p:spPr>
-        <p:style>
-          <a:lnRef idx="3">
-            <a:schemeClr val="accent1"/>
-          </a:lnRef>
-          <a:fillRef idx="0">
-            <a:schemeClr val="accent1"/>
-          </a:fillRef>
-          <a:effectRef idx="2">
-            <a:schemeClr val="accent1"/>
           </a:effectRef>
           <a:fontRef idx="minor">
             <a:schemeClr val="tx1"/>
@@ -5271,6 +5193,1956 @@
 </file>
 
 <file path=ppt/slides/slide2.xml><?xml version="1.0" encoding="utf-8"?>
+<p:sld xmlns:a="http://schemas.openxmlformats.org/drawingml/2006/main" xmlns:r="http://schemas.openxmlformats.org/officeDocument/2006/relationships" xmlns:p="http://schemas.openxmlformats.org/presentationml/2006/main">
+  <p:cSld>
+    <p:spTree>
+      <p:nvGrpSpPr>
+        <p:cNvPr id="1" name=""/>
+        <p:cNvGrpSpPr/>
+        <p:nvPr/>
+      </p:nvGrpSpPr>
+      <p:grpSpPr>
+        <a:xfrm>
+          <a:off x="0" y="0"/>
+          <a:ext cx="0" cy="0"/>
+          <a:chOff x="0" y="0"/>
+          <a:chExt cx="0" cy="0"/>
+        </a:xfrm>
+      </p:grpSpPr>
+      <p:cxnSp>
+        <p:nvCxnSpPr>
+          <p:cNvPr id="5" name="Straight Arrow Connector 4">
+            <a:extLst>
+              <a:ext uri="{FF2B5EF4-FFF2-40B4-BE49-F238E27FC236}">
+                <a16:creationId xmlns:a16="http://schemas.microsoft.com/office/drawing/2014/main" id="{ED306833-0DE3-43A2-8E6D-4DD57DF8B6C4}"/>
+              </a:ext>
+            </a:extLst>
+          </p:cNvPr>
+          <p:cNvCxnSpPr>
+            <a:cxnSpLocks/>
+          </p:cNvCxnSpPr>
+          <p:nvPr/>
+        </p:nvCxnSpPr>
+        <p:spPr>
+          <a:xfrm>
+            <a:off x="1475117" y="2424023"/>
+            <a:ext cx="2191109" cy="0"/>
+          </a:xfrm>
+          <a:prstGeom prst="straightConnector1">
+            <a:avLst/>
+          </a:prstGeom>
+          <a:ln w="12700">
+            <a:tailEnd type="triangle"/>
+          </a:ln>
+        </p:spPr>
+        <p:style>
+          <a:lnRef idx="1">
+            <a:schemeClr val="dk1"/>
+          </a:lnRef>
+          <a:fillRef idx="0">
+            <a:schemeClr val="dk1"/>
+          </a:fillRef>
+          <a:effectRef idx="0">
+            <a:schemeClr val="dk1"/>
+          </a:effectRef>
+          <a:fontRef idx="minor">
+            <a:schemeClr val="tx1"/>
+          </a:fontRef>
+        </p:style>
+      </p:cxnSp>
+      <p:cxnSp>
+        <p:nvCxnSpPr>
+          <p:cNvPr id="8" name="Straight Connector 7">
+            <a:extLst>
+              <a:ext uri="{FF2B5EF4-FFF2-40B4-BE49-F238E27FC236}">
+                <a16:creationId xmlns:a16="http://schemas.microsoft.com/office/drawing/2014/main" id="{DC325EF6-7873-4663-AB04-B7A25BCF817E}"/>
+              </a:ext>
+            </a:extLst>
+          </p:cNvPr>
+          <p:cNvCxnSpPr>
+            <a:cxnSpLocks/>
+          </p:cNvCxnSpPr>
+          <p:nvPr/>
+        </p:nvCxnSpPr>
+        <p:spPr>
+          <a:xfrm>
+            <a:off x="1871932" y="2355011"/>
+            <a:ext cx="0" cy="60386"/>
+          </a:xfrm>
+          <a:prstGeom prst="line">
+            <a:avLst/>
+          </a:prstGeom>
+          <a:ln w="12700"/>
+        </p:spPr>
+        <p:style>
+          <a:lnRef idx="1">
+            <a:schemeClr val="dk1"/>
+          </a:lnRef>
+          <a:fillRef idx="0">
+            <a:schemeClr val="dk1"/>
+          </a:fillRef>
+          <a:effectRef idx="0">
+            <a:schemeClr val="dk1"/>
+          </a:effectRef>
+          <a:fontRef idx="minor">
+            <a:schemeClr val="tx1"/>
+          </a:fontRef>
+        </p:style>
+      </p:cxnSp>
+      <p:cxnSp>
+        <p:nvCxnSpPr>
+          <p:cNvPr id="14" name="Straight Connector 13">
+            <a:extLst>
+              <a:ext uri="{FF2B5EF4-FFF2-40B4-BE49-F238E27FC236}">
+                <a16:creationId xmlns:a16="http://schemas.microsoft.com/office/drawing/2014/main" id="{031BA9B3-F886-4792-857F-91594C97D0B4}"/>
+              </a:ext>
+            </a:extLst>
+          </p:cNvPr>
+          <p:cNvCxnSpPr>
+            <a:cxnSpLocks/>
+          </p:cNvCxnSpPr>
+          <p:nvPr/>
+        </p:nvCxnSpPr>
+        <p:spPr>
+          <a:xfrm>
+            <a:off x="3286705" y="2329132"/>
+            <a:ext cx="0" cy="86264"/>
+          </a:xfrm>
+          <a:prstGeom prst="line">
+            <a:avLst/>
+          </a:prstGeom>
+          <a:ln w="12700"/>
+        </p:spPr>
+        <p:style>
+          <a:lnRef idx="1">
+            <a:schemeClr val="dk1"/>
+          </a:lnRef>
+          <a:fillRef idx="0">
+            <a:schemeClr val="dk1"/>
+          </a:fillRef>
+          <a:effectRef idx="0">
+            <a:schemeClr val="dk1"/>
+          </a:effectRef>
+          <a:fontRef idx="minor">
+            <a:schemeClr val="tx1"/>
+          </a:fontRef>
+        </p:style>
+      </p:cxnSp>
+      <mc:AlternateContent xmlns:mc="http://schemas.openxmlformats.org/markup-compatibility/2006">
+        <mc:Choice xmlns:a14="http://schemas.microsoft.com/office/drawing/2010/main" Requires="a14">
+          <p:sp>
+            <p:nvSpPr>
+              <p:cNvPr id="18" name="TextBox 17">
+                <a:extLst>
+                  <a:ext uri="{FF2B5EF4-FFF2-40B4-BE49-F238E27FC236}">
+                    <a16:creationId xmlns:a16="http://schemas.microsoft.com/office/drawing/2014/main" id="{C525E05E-8B2E-4CBD-80B7-7DF54D2D72FC}"/>
+                  </a:ext>
+                </a:extLst>
+              </p:cNvPr>
+              <p:cNvSpPr txBox="1"/>
+              <p:nvPr/>
+            </p:nvSpPr>
+            <p:spPr>
+              <a:xfrm>
+                <a:off x="1713139" y="2385204"/>
+                <a:ext cx="317586" cy="276999"/>
+              </a:xfrm>
+              <a:prstGeom prst="rect">
+                <a:avLst/>
+              </a:prstGeom>
+              <a:noFill/>
+            </p:spPr>
+            <p:txBody>
+              <a:bodyPr wrap="none" rtlCol="0">
+                <a:spAutoFit/>
+              </a:bodyPr>
+              <a:lstStyle/>
+              <a:p>
+                <a:pPr/>
+                <a14:m>
+                  <m:oMathPara xmlns:m="http://schemas.openxmlformats.org/officeDocument/2006/math">
+                    <m:oMathParaPr>
+                      <m:jc m:val="centerGroup"/>
+                    </m:oMathParaPr>
+                    <m:oMath xmlns:m="http://schemas.openxmlformats.org/officeDocument/2006/math">
+                      <m:r>
+                        <a:rPr lang="en-US" sz="1200" i="1" smtClean="0">
+                          <a:latin typeface="Cambria Math" panose="02040503050406030204" pitchFamily="18" charset="0"/>
+                          <a:ea typeface="Cambria Math" panose="02040503050406030204" pitchFamily="18" charset="0"/>
+                        </a:rPr>
+                        <m:t>𝛼</m:t>
+                      </m:r>
+                    </m:oMath>
+                  </m:oMathPara>
+                </a14:m>
+                <a:endParaRPr lang="en-US" dirty="0"/>
+              </a:p>
+            </p:txBody>
+          </p:sp>
+        </mc:Choice>
+        <mc:Fallback>
+          <p:sp>
+            <p:nvSpPr>
+              <p:cNvPr id="18" name="TextBox 17">
+                <a:extLst>
+                  <a:ext uri="{FF2B5EF4-FFF2-40B4-BE49-F238E27FC236}">
+                    <a16:creationId xmlns:a16="http://schemas.microsoft.com/office/drawing/2014/main" id="{C525E05E-8B2E-4CBD-80B7-7DF54D2D72FC}"/>
+                  </a:ext>
+                </a:extLst>
+              </p:cNvPr>
+              <p:cNvSpPr txBox="1">
+                <a:spLocks noRot="1" noChangeAspect="1" noMove="1" noResize="1" noEditPoints="1" noAdjustHandles="1" noChangeArrowheads="1" noChangeShapeType="1" noTextEdit="1"/>
+              </p:cNvSpPr>
+              <p:nvPr/>
+            </p:nvSpPr>
+            <p:spPr>
+              <a:xfrm>
+                <a:off x="1713139" y="2385204"/>
+                <a:ext cx="317586" cy="276999"/>
+              </a:xfrm>
+              <a:prstGeom prst="rect">
+                <a:avLst/>
+              </a:prstGeom>
+              <a:blipFill>
+                <a:blip r:embed="rId2"/>
+                <a:stretch>
+                  <a:fillRect/>
+                </a:stretch>
+              </a:blipFill>
+            </p:spPr>
+            <p:txBody>
+              <a:bodyPr/>
+              <a:lstStyle/>
+              <a:p>
+                <a:r>
+                  <a:rPr lang="en-US">
+                    <a:noFill/>
+                  </a:rPr>
+                  <a:t> </a:t>
+                </a:r>
+              </a:p>
+            </p:txBody>
+          </p:sp>
+        </mc:Fallback>
+      </mc:AlternateContent>
+      <mc:AlternateContent xmlns:mc="http://schemas.openxmlformats.org/markup-compatibility/2006">
+        <mc:Choice xmlns:a14="http://schemas.microsoft.com/office/drawing/2010/main" Requires="a14">
+          <p:sp>
+            <p:nvSpPr>
+              <p:cNvPr id="19" name="TextBox 18">
+                <a:extLst>
+                  <a:ext uri="{FF2B5EF4-FFF2-40B4-BE49-F238E27FC236}">
+                    <a16:creationId xmlns:a16="http://schemas.microsoft.com/office/drawing/2014/main" id="{24BFBB3E-4059-42E6-B3F5-067C4C3B4113}"/>
+                  </a:ext>
+                </a:extLst>
+              </p:cNvPr>
+              <p:cNvSpPr txBox="1"/>
+              <p:nvPr/>
+            </p:nvSpPr>
+            <p:spPr>
+              <a:xfrm>
+                <a:off x="3107763" y="2397839"/>
+                <a:ext cx="317586" cy="276999"/>
+              </a:xfrm>
+              <a:prstGeom prst="rect">
+                <a:avLst/>
+              </a:prstGeom>
+              <a:noFill/>
+            </p:spPr>
+            <p:txBody>
+              <a:bodyPr wrap="none" rtlCol="0">
+                <a:spAutoFit/>
+              </a:bodyPr>
+              <a:lstStyle/>
+              <a:p>
+                <a:pPr/>
+                <a14:m>
+                  <m:oMathPara xmlns:m="http://schemas.openxmlformats.org/officeDocument/2006/math">
+                    <m:oMathParaPr>
+                      <m:jc m:val="centerGroup"/>
+                    </m:oMathParaPr>
+                    <m:oMath xmlns:m="http://schemas.openxmlformats.org/officeDocument/2006/math">
+                      <m:r>
+                        <a:rPr lang="en-US" sz="1200" i="1" smtClean="0">
+                          <a:latin typeface="Cambria Math" panose="02040503050406030204" pitchFamily="18" charset="0"/>
+                          <a:ea typeface="Cambria Math" panose="02040503050406030204" pitchFamily="18" charset="0"/>
+                        </a:rPr>
+                        <m:t>𝛽</m:t>
+                      </m:r>
+                    </m:oMath>
+                  </m:oMathPara>
+                </a14:m>
+                <a:endParaRPr lang="en-US" sz="1200" dirty="0"/>
+              </a:p>
+            </p:txBody>
+          </p:sp>
+        </mc:Choice>
+        <mc:Fallback>
+          <p:sp>
+            <p:nvSpPr>
+              <p:cNvPr id="19" name="TextBox 18">
+                <a:extLst>
+                  <a:ext uri="{FF2B5EF4-FFF2-40B4-BE49-F238E27FC236}">
+                    <a16:creationId xmlns:a16="http://schemas.microsoft.com/office/drawing/2014/main" id="{24BFBB3E-4059-42E6-B3F5-067C4C3B4113}"/>
+                  </a:ext>
+                </a:extLst>
+              </p:cNvPr>
+              <p:cNvSpPr txBox="1">
+                <a:spLocks noRot="1" noChangeAspect="1" noMove="1" noResize="1" noEditPoints="1" noAdjustHandles="1" noChangeArrowheads="1" noChangeShapeType="1" noTextEdit="1"/>
+              </p:cNvSpPr>
+              <p:nvPr/>
+            </p:nvSpPr>
+            <p:spPr>
+              <a:xfrm>
+                <a:off x="3107763" y="2397839"/>
+                <a:ext cx="317586" cy="276999"/>
+              </a:xfrm>
+              <a:prstGeom prst="rect">
+                <a:avLst/>
+              </a:prstGeom>
+              <a:blipFill>
+                <a:blip r:embed="rId3"/>
+                <a:stretch>
+                  <a:fillRect b="-4348"/>
+                </a:stretch>
+              </a:blipFill>
+            </p:spPr>
+            <p:txBody>
+              <a:bodyPr/>
+              <a:lstStyle/>
+              <a:p>
+                <a:r>
+                  <a:rPr lang="en-US">
+                    <a:noFill/>
+                  </a:rPr>
+                  <a:t> </a:t>
+                </a:r>
+              </a:p>
+            </p:txBody>
+          </p:sp>
+        </mc:Fallback>
+      </mc:AlternateContent>
+      <mc:AlternateContent xmlns:mc="http://schemas.openxmlformats.org/markup-compatibility/2006">
+        <mc:Choice xmlns:a14="http://schemas.microsoft.com/office/drawing/2010/main" Requires="a14">
+          <p:sp>
+            <p:nvSpPr>
+              <p:cNvPr id="20" name="TextBox 19">
+                <a:extLst>
+                  <a:ext uri="{FF2B5EF4-FFF2-40B4-BE49-F238E27FC236}">
+                    <a16:creationId xmlns:a16="http://schemas.microsoft.com/office/drawing/2014/main" id="{63339690-FE0F-4310-B6F1-C9443E99543A}"/>
+                  </a:ext>
+                </a:extLst>
+              </p:cNvPr>
+              <p:cNvSpPr txBox="1"/>
+              <p:nvPr/>
+            </p:nvSpPr>
+            <p:spPr>
+              <a:xfrm>
+                <a:off x="3497913" y="2411388"/>
+                <a:ext cx="284629" cy="276999"/>
+              </a:xfrm>
+              <a:prstGeom prst="rect">
+                <a:avLst/>
+              </a:prstGeom>
+              <a:noFill/>
+            </p:spPr>
+            <p:txBody>
+              <a:bodyPr wrap="none" rtlCol="0">
+                <a:spAutoFit/>
+              </a:bodyPr>
+              <a:lstStyle/>
+              <a:p>
+                <a:pPr/>
+                <a14:m>
+                  <m:oMathPara xmlns:m="http://schemas.openxmlformats.org/officeDocument/2006/math">
+                    <m:oMathParaPr>
+                      <m:jc m:val="centerGroup"/>
+                    </m:oMathParaPr>
+                    <m:oMath xmlns:m="http://schemas.openxmlformats.org/officeDocument/2006/math">
+                      <m:r>
+                        <a:rPr lang="en-US" sz="1200" b="0" i="1" smtClean="0">
+                          <a:latin typeface="Cambria Math" panose="02040503050406030204" pitchFamily="18" charset="0"/>
+                          <a:ea typeface="Cambria Math" panose="02040503050406030204" pitchFamily="18" charset="0"/>
+                        </a:rPr>
+                        <m:t>𝑡</m:t>
+                      </m:r>
+                    </m:oMath>
+                  </m:oMathPara>
+                </a14:m>
+                <a:endParaRPr lang="en-US" sz="1200" dirty="0"/>
+              </a:p>
+            </p:txBody>
+          </p:sp>
+        </mc:Choice>
+        <mc:Fallback>
+          <p:sp>
+            <p:nvSpPr>
+              <p:cNvPr id="20" name="TextBox 19">
+                <a:extLst>
+                  <a:ext uri="{FF2B5EF4-FFF2-40B4-BE49-F238E27FC236}">
+                    <a16:creationId xmlns:a16="http://schemas.microsoft.com/office/drawing/2014/main" id="{63339690-FE0F-4310-B6F1-C9443E99543A}"/>
+                  </a:ext>
+                </a:extLst>
+              </p:cNvPr>
+              <p:cNvSpPr txBox="1">
+                <a:spLocks noRot="1" noChangeAspect="1" noMove="1" noResize="1" noEditPoints="1" noAdjustHandles="1" noChangeArrowheads="1" noChangeShapeType="1" noTextEdit="1"/>
+              </p:cNvSpPr>
+              <p:nvPr/>
+            </p:nvSpPr>
+            <p:spPr>
+              <a:xfrm>
+                <a:off x="3497913" y="2411388"/>
+                <a:ext cx="284629" cy="276999"/>
+              </a:xfrm>
+              <a:prstGeom prst="rect">
+                <a:avLst/>
+              </a:prstGeom>
+              <a:blipFill>
+                <a:blip r:embed="rId4"/>
+                <a:stretch>
+                  <a:fillRect/>
+                </a:stretch>
+              </a:blipFill>
+            </p:spPr>
+            <p:txBody>
+              <a:bodyPr/>
+              <a:lstStyle/>
+              <a:p>
+                <a:r>
+                  <a:rPr lang="en-US">
+                    <a:noFill/>
+                  </a:rPr>
+                  <a:t> </a:t>
+                </a:r>
+              </a:p>
+            </p:txBody>
+          </p:sp>
+        </mc:Fallback>
+      </mc:AlternateContent>
+      <p:cxnSp>
+        <p:nvCxnSpPr>
+          <p:cNvPr id="22" name="Straight Arrow Connector 21">
+            <a:extLst>
+              <a:ext uri="{FF2B5EF4-FFF2-40B4-BE49-F238E27FC236}">
+                <a16:creationId xmlns:a16="http://schemas.microsoft.com/office/drawing/2014/main" id="{3CB38A04-3809-4E87-AFC0-F8EE22B5BB94}"/>
+              </a:ext>
+            </a:extLst>
+          </p:cNvPr>
+          <p:cNvCxnSpPr/>
+          <p:nvPr/>
+        </p:nvCxnSpPr>
+        <p:spPr>
+          <a:xfrm>
+            <a:off x="5607170" y="2553896"/>
+            <a:ext cx="1673524" cy="0"/>
+          </a:xfrm>
+          <a:prstGeom prst="straightConnector1">
+            <a:avLst/>
+          </a:prstGeom>
+          <a:ln w="12700">
+            <a:tailEnd type="triangle"/>
+          </a:ln>
+        </p:spPr>
+        <p:style>
+          <a:lnRef idx="1">
+            <a:schemeClr val="dk1"/>
+          </a:lnRef>
+          <a:fillRef idx="0">
+            <a:schemeClr val="dk1"/>
+          </a:fillRef>
+          <a:effectRef idx="0">
+            <a:schemeClr val="dk1"/>
+          </a:effectRef>
+          <a:fontRef idx="minor">
+            <a:schemeClr val="tx1"/>
+          </a:fontRef>
+        </p:style>
+      </p:cxnSp>
+      <p:cxnSp>
+        <p:nvCxnSpPr>
+          <p:cNvPr id="23" name="Straight Arrow Connector 22">
+            <a:extLst>
+              <a:ext uri="{FF2B5EF4-FFF2-40B4-BE49-F238E27FC236}">
+                <a16:creationId xmlns:a16="http://schemas.microsoft.com/office/drawing/2014/main" id="{88938710-8E86-41C2-AE98-8CE569591AF9}"/>
+              </a:ext>
+            </a:extLst>
+          </p:cNvPr>
+          <p:cNvCxnSpPr>
+            <a:cxnSpLocks/>
+          </p:cNvCxnSpPr>
+          <p:nvPr/>
+        </p:nvCxnSpPr>
+        <p:spPr>
+          <a:xfrm flipV="1">
+            <a:off x="5607170" y="974785"/>
+            <a:ext cx="0" cy="1579112"/>
+          </a:xfrm>
+          <a:prstGeom prst="straightConnector1">
+            <a:avLst/>
+          </a:prstGeom>
+          <a:ln w="12700">
+            <a:tailEnd type="triangle"/>
+          </a:ln>
+        </p:spPr>
+        <p:style>
+          <a:lnRef idx="1">
+            <a:schemeClr val="dk1"/>
+          </a:lnRef>
+          <a:fillRef idx="0">
+            <a:schemeClr val="dk1"/>
+          </a:fillRef>
+          <a:effectRef idx="0">
+            <a:schemeClr val="dk1"/>
+          </a:effectRef>
+          <a:fontRef idx="minor">
+            <a:schemeClr val="tx1"/>
+          </a:fontRef>
+        </p:style>
+      </p:cxnSp>
+      <p:cxnSp>
+        <p:nvCxnSpPr>
+          <p:cNvPr id="27" name="Straight Arrow Connector 26">
+            <a:extLst>
+              <a:ext uri="{FF2B5EF4-FFF2-40B4-BE49-F238E27FC236}">
+                <a16:creationId xmlns:a16="http://schemas.microsoft.com/office/drawing/2014/main" id="{BC08FEE1-656F-4A3D-8B0C-5145BF313F92}"/>
+              </a:ext>
+            </a:extLst>
+          </p:cNvPr>
+          <p:cNvCxnSpPr>
+            <a:cxnSpLocks/>
+          </p:cNvCxnSpPr>
+          <p:nvPr/>
+        </p:nvCxnSpPr>
+        <p:spPr>
+          <a:xfrm flipH="1">
+            <a:off x="4799162" y="2553420"/>
+            <a:ext cx="808008" cy="1069064"/>
+          </a:xfrm>
+          <a:prstGeom prst="straightConnector1">
+            <a:avLst/>
+          </a:prstGeom>
+          <a:ln w="12700">
+            <a:tailEnd type="triangle"/>
+          </a:ln>
+        </p:spPr>
+        <p:style>
+          <a:lnRef idx="1">
+            <a:schemeClr val="dk1"/>
+          </a:lnRef>
+          <a:fillRef idx="0">
+            <a:schemeClr val="dk1"/>
+          </a:fillRef>
+          <a:effectRef idx="0">
+            <a:schemeClr val="dk1"/>
+          </a:effectRef>
+          <a:fontRef idx="minor">
+            <a:schemeClr val="tx1"/>
+          </a:fontRef>
+        </p:style>
+      </p:cxnSp>
+      <p:cxnSp>
+        <p:nvCxnSpPr>
+          <p:cNvPr id="29" name="Straight Arrow Connector 28">
+            <a:extLst>
+              <a:ext uri="{FF2B5EF4-FFF2-40B4-BE49-F238E27FC236}">
+                <a16:creationId xmlns:a16="http://schemas.microsoft.com/office/drawing/2014/main" id="{CEB61469-5E4A-4E92-BAD2-F2098E864899}"/>
+              </a:ext>
+            </a:extLst>
+          </p:cNvPr>
+          <p:cNvCxnSpPr/>
+          <p:nvPr/>
+        </p:nvCxnSpPr>
+        <p:spPr>
+          <a:xfrm>
+            <a:off x="5607170" y="2554373"/>
+            <a:ext cx="1673524" cy="0"/>
+          </a:xfrm>
+          <a:prstGeom prst="straightConnector1">
+            <a:avLst/>
+          </a:prstGeom>
+          <a:ln w="12700">
+            <a:tailEnd type="triangle"/>
+          </a:ln>
+        </p:spPr>
+        <p:style>
+          <a:lnRef idx="1">
+            <a:schemeClr val="dk1"/>
+          </a:lnRef>
+          <a:fillRef idx="0">
+            <a:schemeClr val="dk1"/>
+          </a:fillRef>
+          <a:effectRef idx="0">
+            <a:schemeClr val="dk1"/>
+          </a:effectRef>
+          <a:fontRef idx="minor">
+            <a:schemeClr val="tx1"/>
+          </a:fontRef>
+        </p:style>
+      </p:cxnSp>
+      <mc:AlternateContent xmlns:mc="http://schemas.openxmlformats.org/markup-compatibility/2006">
+        <mc:Choice xmlns:a14="http://schemas.microsoft.com/office/drawing/2010/main" Requires="a14">
+          <p:sp>
+            <p:nvSpPr>
+              <p:cNvPr id="35" name="TextBox 34">
+                <a:extLst>
+                  <a:ext uri="{FF2B5EF4-FFF2-40B4-BE49-F238E27FC236}">
+                    <a16:creationId xmlns:a16="http://schemas.microsoft.com/office/drawing/2014/main" id="{A52FC8A2-521C-4CB7-AEF1-4C1D50578CF2}"/>
+                  </a:ext>
+                </a:extLst>
+              </p:cNvPr>
+              <p:cNvSpPr txBox="1"/>
+              <p:nvPr/>
+            </p:nvSpPr>
+            <p:spPr>
+              <a:xfrm>
+                <a:off x="4799161" y="3513702"/>
+                <a:ext cx="306366" cy="276999"/>
+              </a:xfrm>
+              <a:prstGeom prst="rect">
+                <a:avLst/>
+              </a:prstGeom>
+              <a:noFill/>
+            </p:spPr>
+            <p:txBody>
+              <a:bodyPr wrap="none" rtlCol="0">
+                <a:spAutoFit/>
+              </a:bodyPr>
+              <a:lstStyle/>
+              <a:p>
+                <a:pPr/>
+                <a14:m>
+                  <m:oMathPara xmlns:m="http://schemas.openxmlformats.org/officeDocument/2006/math">
+                    <m:oMathParaPr>
+                      <m:jc m:val="centerGroup"/>
+                    </m:oMathParaPr>
+                    <m:oMath xmlns:m="http://schemas.openxmlformats.org/officeDocument/2006/math">
+                      <m:r>
+                        <a:rPr lang="en-US" sz="1200" b="0" i="1" smtClean="0">
+                          <a:latin typeface="Cambria Math" panose="02040503050406030204" pitchFamily="18" charset="0"/>
+                          <a:ea typeface="Cambria Math" panose="02040503050406030204" pitchFamily="18" charset="0"/>
+                        </a:rPr>
+                        <m:t>𝑥</m:t>
+                      </m:r>
+                    </m:oMath>
+                  </m:oMathPara>
+                </a14:m>
+                <a:endParaRPr lang="en-US" sz="1200" dirty="0"/>
+              </a:p>
+            </p:txBody>
+          </p:sp>
+        </mc:Choice>
+        <mc:Fallback>
+          <p:sp>
+            <p:nvSpPr>
+              <p:cNvPr id="35" name="TextBox 34">
+                <a:extLst>
+                  <a:ext uri="{FF2B5EF4-FFF2-40B4-BE49-F238E27FC236}">
+                    <a16:creationId xmlns:a16="http://schemas.microsoft.com/office/drawing/2014/main" id="{A52FC8A2-521C-4CB7-AEF1-4C1D50578CF2}"/>
+                  </a:ext>
+                </a:extLst>
+              </p:cNvPr>
+              <p:cNvSpPr txBox="1">
+                <a:spLocks noRot="1" noChangeAspect="1" noMove="1" noResize="1" noEditPoints="1" noAdjustHandles="1" noChangeArrowheads="1" noChangeShapeType="1" noTextEdit="1"/>
+              </p:cNvSpPr>
+              <p:nvPr/>
+            </p:nvSpPr>
+            <p:spPr>
+              <a:xfrm>
+                <a:off x="4799161" y="3513702"/>
+                <a:ext cx="306366" cy="276999"/>
+              </a:xfrm>
+              <a:prstGeom prst="rect">
+                <a:avLst/>
+              </a:prstGeom>
+              <a:blipFill>
+                <a:blip r:embed="rId5"/>
+                <a:stretch>
+                  <a:fillRect/>
+                </a:stretch>
+              </a:blipFill>
+            </p:spPr>
+            <p:txBody>
+              <a:bodyPr/>
+              <a:lstStyle/>
+              <a:p>
+                <a:r>
+                  <a:rPr lang="en-US">
+                    <a:noFill/>
+                  </a:rPr>
+                  <a:t> </a:t>
+                </a:r>
+              </a:p>
+            </p:txBody>
+          </p:sp>
+        </mc:Fallback>
+      </mc:AlternateContent>
+      <mc:AlternateContent xmlns:mc="http://schemas.openxmlformats.org/markup-compatibility/2006">
+        <mc:Choice xmlns:a14="http://schemas.microsoft.com/office/drawing/2010/main" Requires="a14">
+          <p:sp>
+            <p:nvSpPr>
+              <p:cNvPr id="36" name="TextBox 35">
+                <a:extLst>
+                  <a:ext uri="{FF2B5EF4-FFF2-40B4-BE49-F238E27FC236}">
+                    <a16:creationId xmlns:a16="http://schemas.microsoft.com/office/drawing/2014/main" id="{4D6D8DA7-3A1A-495D-B010-B7F83F854DBD}"/>
+                  </a:ext>
+                </a:extLst>
+              </p:cNvPr>
+              <p:cNvSpPr txBox="1"/>
+              <p:nvPr/>
+            </p:nvSpPr>
+            <p:spPr>
+              <a:xfrm>
+                <a:off x="1309499" y="2436659"/>
+                <a:ext cx="327910" cy="276999"/>
+              </a:xfrm>
+              <a:prstGeom prst="rect">
+                <a:avLst/>
+              </a:prstGeom>
+              <a:noFill/>
+            </p:spPr>
+            <p:txBody>
+              <a:bodyPr wrap="none" rtlCol="0">
+                <a:spAutoFit/>
+              </a:bodyPr>
+              <a:lstStyle/>
+              <a:p>
+                <a:pPr/>
+                <a14:m>
+                  <m:oMathPara xmlns:m="http://schemas.openxmlformats.org/officeDocument/2006/math">
+                    <m:oMathParaPr>
+                      <m:jc m:val="centerGroup"/>
+                    </m:oMathParaPr>
+                    <m:oMath xmlns:m="http://schemas.openxmlformats.org/officeDocument/2006/math">
+                      <m:r>
+                        <a:rPr lang="en-US" sz="1200" b="0" i="1" smtClean="0">
+                          <a:latin typeface="Cambria Math" panose="02040503050406030204" pitchFamily="18" charset="0"/>
+                        </a:rPr>
+                        <m:t>𝑂</m:t>
+                      </m:r>
+                    </m:oMath>
+                  </m:oMathPara>
+                </a14:m>
+                <a:endParaRPr lang="en-US" sz="1200" dirty="0"/>
+              </a:p>
+            </p:txBody>
+          </p:sp>
+        </mc:Choice>
+        <mc:Fallback>
+          <p:sp>
+            <p:nvSpPr>
+              <p:cNvPr id="36" name="TextBox 35">
+                <a:extLst>
+                  <a:ext uri="{FF2B5EF4-FFF2-40B4-BE49-F238E27FC236}">
+                    <a16:creationId xmlns:a16="http://schemas.microsoft.com/office/drawing/2014/main" id="{4D6D8DA7-3A1A-495D-B010-B7F83F854DBD}"/>
+                  </a:ext>
+                </a:extLst>
+              </p:cNvPr>
+              <p:cNvSpPr txBox="1">
+                <a:spLocks noRot="1" noChangeAspect="1" noMove="1" noResize="1" noEditPoints="1" noAdjustHandles="1" noChangeArrowheads="1" noChangeShapeType="1" noTextEdit="1"/>
+              </p:cNvSpPr>
+              <p:nvPr/>
+            </p:nvSpPr>
+            <p:spPr>
+              <a:xfrm>
+                <a:off x="1309499" y="2436659"/>
+                <a:ext cx="327910" cy="276999"/>
+              </a:xfrm>
+              <a:prstGeom prst="rect">
+                <a:avLst/>
+              </a:prstGeom>
+              <a:blipFill>
+                <a:blip r:embed="rId6"/>
+                <a:stretch>
+                  <a:fillRect/>
+                </a:stretch>
+              </a:blipFill>
+            </p:spPr>
+            <p:txBody>
+              <a:bodyPr/>
+              <a:lstStyle/>
+              <a:p>
+                <a:r>
+                  <a:rPr lang="en-US">
+                    <a:noFill/>
+                  </a:rPr>
+                  <a:t> </a:t>
+                </a:r>
+              </a:p>
+            </p:txBody>
+          </p:sp>
+        </mc:Fallback>
+      </mc:AlternateContent>
+      <mc:AlternateContent xmlns:mc="http://schemas.openxmlformats.org/markup-compatibility/2006">
+        <mc:Choice xmlns:a14="http://schemas.microsoft.com/office/drawing/2010/main" Requires="a14">
+          <p:sp>
+            <p:nvSpPr>
+              <p:cNvPr id="37" name="TextBox 36">
+                <a:extLst>
+                  <a:ext uri="{FF2B5EF4-FFF2-40B4-BE49-F238E27FC236}">
+                    <a16:creationId xmlns:a16="http://schemas.microsoft.com/office/drawing/2014/main" id="{BF1E4C60-3D30-45B9-9342-6B847B008391}"/>
+                  </a:ext>
+                </a:extLst>
+              </p:cNvPr>
+              <p:cNvSpPr txBox="1"/>
+              <p:nvPr/>
+            </p:nvSpPr>
+            <p:spPr>
+              <a:xfrm>
+                <a:off x="5529426" y="2575157"/>
+                <a:ext cx="327910" cy="276999"/>
+              </a:xfrm>
+              <a:prstGeom prst="rect">
+                <a:avLst/>
+              </a:prstGeom>
+              <a:noFill/>
+            </p:spPr>
+            <p:txBody>
+              <a:bodyPr wrap="none" rtlCol="0">
+                <a:spAutoFit/>
+              </a:bodyPr>
+              <a:lstStyle/>
+              <a:p>
+                <a:pPr/>
+                <a14:m>
+                  <m:oMathPara xmlns:m="http://schemas.openxmlformats.org/officeDocument/2006/math">
+                    <m:oMathParaPr>
+                      <m:jc m:val="centerGroup"/>
+                    </m:oMathParaPr>
+                    <m:oMath xmlns:m="http://schemas.openxmlformats.org/officeDocument/2006/math">
+                      <m:r>
+                        <a:rPr lang="en-US" sz="1200" b="0" i="1" smtClean="0">
+                          <a:latin typeface="Cambria Math" panose="02040503050406030204" pitchFamily="18" charset="0"/>
+                        </a:rPr>
+                        <m:t>𝑂</m:t>
+                      </m:r>
+                    </m:oMath>
+                  </m:oMathPara>
+                </a14:m>
+                <a:endParaRPr lang="en-US" sz="1200" dirty="0"/>
+              </a:p>
+            </p:txBody>
+          </p:sp>
+        </mc:Choice>
+        <mc:Fallback>
+          <p:sp>
+            <p:nvSpPr>
+              <p:cNvPr id="37" name="TextBox 36">
+                <a:extLst>
+                  <a:ext uri="{FF2B5EF4-FFF2-40B4-BE49-F238E27FC236}">
+                    <a16:creationId xmlns:a16="http://schemas.microsoft.com/office/drawing/2014/main" id="{BF1E4C60-3D30-45B9-9342-6B847B008391}"/>
+                  </a:ext>
+                </a:extLst>
+              </p:cNvPr>
+              <p:cNvSpPr txBox="1">
+                <a:spLocks noRot="1" noChangeAspect="1" noMove="1" noResize="1" noEditPoints="1" noAdjustHandles="1" noChangeArrowheads="1" noChangeShapeType="1" noTextEdit="1"/>
+              </p:cNvSpPr>
+              <p:nvPr/>
+            </p:nvSpPr>
+            <p:spPr>
+              <a:xfrm>
+                <a:off x="5529426" y="2575157"/>
+                <a:ext cx="327910" cy="276999"/>
+              </a:xfrm>
+              <a:prstGeom prst="rect">
+                <a:avLst/>
+              </a:prstGeom>
+              <a:blipFill>
+                <a:blip r:embed="rId7"/>
+                <a:stretch>
+                  <a:fillRect/>
+                </a:stretch>
+              </a:blipFill>
+            </p:spPr>
+            <p:txBody>
+              <a:bodyPr/>
+              <a:lstStyle/>
+              <a:p>
+                <a:r>
+                  <a:rPr lang="en-US">
+                    <a:noFill/>
+                  </a:rPr>
+                  <a:t> </a:t>
+                </a:r>
+              </a:p>
+            </p:txBody>
+          </p:sp>
+        </mc:Fallback>
+      </mc:AlternateContent>
+      <mc:AlternateContent xmlns:mc="http://schemas.openxmlformats.org/markup-compatibility/2006">
+        <mc:Choice xmlns:a14="http://schemas.microsoft.com/office/drawing/2010/main" Requires="a14">
+          <p:sp>
+            <p:nvSpPr>
+              <p:cNvPr id="38" name="TextBox 37">
+                <a:extLst>
+                  <a:ext uri="{FF2B5EF4-FFF2-40B4-BE49-F238E27FC236}">
+                    <a16:creationId xmlns:a16="http://schemas.microsoft.com/office/drawing/2014/main" id="{1241DAA3-F61A-41A0-905B-B3E501F7BD89}"/>
+                  </a:ext>
+                </a:extLst>
+              </p:cNvPr>
+              <p:cNvSpPr txBox="1"/>
+              <p:nvPr/>
+            </p:nvSpPr>
+            <p:spPr>
+              <a:xfrm>
+                <a:off x="7127511" y="2575158"/>
+                <a:ext cx="309123" cy="276999"/>
+              </a:xfrm>
+              <a:prstGeom prst="rect">
+                <a:avLst/>
+              </a:prstGeom>
+              <a:noFill/>
+            </p:spPr>
+            <p:txBody>
+              <a:bodyPr wrap="none" rtlCol="0">
+                <a:spAutoFit/>
+              </a:bodyPr>
+              <a:lstStyle/>
+              <a:p>
+                <a:pPr/>
+                <a14:m>
+                  <m:oMathPara xmlns:m="http://schemas.openxmlformats.org/officeDocument/2006/math">
+                    <m:oMathParaPr>
+                      <m:jc m:val="centerGroup"/>
+                    </m:oMathParaPr>
+                    <m:oMath xmlns:m="http://schemas.openxmlformats.org/officeDocument/2006/math">
+                      <m:r>
+                        <a:rPr lang="en-US" sz="1200" b="0" i="1" smtClean="0">
+                          <a:latin typeface="Cambria Math" panose="02040503050406030204" pitchFamily="18" charset="0"/>
+                        </a:rPr>
+                        <m:t>𝑦</m:t>
+                      </m:r>
+                    </m:oMath>
+                  </m:oMathPara>
+                </a14:m>
+                <a:endParaRPr lang="en-US" sz="1200" dirty="0"/>
+              </a:p>
+            </p:txBody>
+          </p:sp>
+        </mc:Choice>
+        <mc:Fallback>
+          <p:sp>
+            <p:nvSpPr>
+              <p:cNvPr id="38" name="TextBox 37">
+                <a:extLst>
+                  <a:ext uri="{FF2B5EF4-FFF2-40B4-BE49-F238E27FC236}">
+                    <a16:creationId xmlns:a16="http://schemas.microsoft.com/office/drawing/2014/main" id="{1241DAA3-F61A-41A0-905B-B3E501F7BD89}"/>
+                  </a:ext>
+                </a:extLst>
+              </p:cNvPr>
+              <p:cNvSpPr txBox="1">
+                <a:spLocks noRot="1" noChangeAspect="1" noMove="1" noResize="1" noEditPoints="1" noAdjustHandles="1" noChangeArrowheads="1" noChangeShapeType="1" noTextEdit="1"/>
+              </p:cNvSpPr>
+              <p:nvPr/>
+            </p:nvSpPr>
+            <p:spPr>
+              <a:xfrm>
+                <a:off x="7127511" y="2575158"/>
+                <a:ext cx="309123" cy="276999"/>
+              </a:xfrm>
+              <a:prstGeom prst="rect">
+                <a:avLst/>
+              </a:prstGeom>
+              <a:blipFill>
+                <a:blip r:embed="rId8"/>
+                <a:stretch>
+                  <a:fillRect/>
+                </a:stretch>
+              </a:blipFill>
+            </p:spPr>
+            <p:txBody>
+              <a:bodyPr/>
+              <a:lstStyle/>
+              <a:p>
+                <a:r>
+                  <a:rPr lang="en-US">
+                    <a:noFill/>
+                  </a:rPr>
+                  <a:t> </a:t>
+                </a:r>
+              </a:p>
+            </p:txBody>
+          </p:sp>
+        </mc:Fallback>
+      </mc:AlternateContent>
+      <mc:AlternateContent xmlns:mc="http://schemas.openxmlformats.org/markup-compatibility/2006">
+        <mc:Choice xmlns:a14="http://schemas.microsoft.com/office/drawing/2010/main" Requires="a14">
+          <p:sp>
+            <p:nvSpPr>
+              <p:cNvPr id="39" name="TextBox 38">
+                <a:extLst>
+                  <a:ext uri="{FF2B5EF4-FFF2-40B4-BE49-F238E27FC236}">
+                    <a16:creationId xmlns:a16="http://schemas.microsoft.com/office/drawing/2014/main" id="{EF45C652-8EEC-499C-9ADD-352BFD4FD54F}"/>
+                  </a:ext>
+                </a:extLst>
+              </p:cNvPr>
+              <p:cNvSpPr txBox="1"/>
+              <p:nvPr/>
+            </p:nvSpPr>
+            <p:spPr>
+              <a:xfrm>
+                <a:off x="5607170" y="728458"/>
+                <a:ext cx="296299" cy="276999"/>
+              </a:xfrm>
+              <a:prstGeom prst="rect">
+                <a:avLst/>
+              </a:prstGeom>
+              <a:noFill/>
+            </p:spPr>
+            <p:txBody>
+              <a:bodyPr wrap="none" rtlCol="0">
+                <a:spAutoFit/>
+              </a:bodyPr>
+              <a:lstStyle/>
+              <a:p>
+                <a:pPr/>
+                <a14:m>
+                  <m:oMathPara xmlns:m="http://schemas.openxmlformats.org/officeDocument/2006/math">
+                    <m:oMathParaPr>
+                      <m:jc m:val="centerGroup"/>
+                    </m:oMathParaPr>
+                    <m:oMath xmlns:m="http://schemas.openxmlformats.org/officeDocument/2006/math">
+                      <m:r>
+                        <a:rPr lang="en-US" sz="1200" b="0" i="1" smtClean="0">
+                          <a:latin typeface="Cambria Math" panose="02040503050406030204" pitchFamily="18" charset="0"/>
+                        </a:rPr>
+                        <m:t>𝑧</m:t>
+                      </m:r>
+                    </m:oMath>
+                  </m:oMathPara>
+                </a14:m>
+                <a:endParaRPr lang="en-US" sz="1200" dirty="0"/>
+              </a:p>
+            </p:txBody>
+          </p:sp>
+        </mc:Choice>
+        <mc:Fallback>
+          <p:sp>
+            <p:nvSpPr>
+              <p:cNvPr id="39" name="TextBox 38">
+                <a:extLst>
+                  <a:ext uri="{FF2B5EF4-FFF2-40B4-BE49-F238E27FC236}">
+                    <a16:creationId xmlns:a16="http://schemas.microsoft.com/office/drawing/2014/main" id="{EF45C652-8EEC-499C-9ADD-352BFD4FD54F}"/>
+                  </a:ext>
+                </a:extLst>
+              </p:cNvPr>
+              <p:cNvSpPr txBox="1">
+                <a:spLocks noRot="1" noChangeAspect="1" noMove="1" noResize="1" noEditPoints="1" noAdjustHandles="1" noChangeArrowheads="1" noChangeShapeType="1" noTextEdit="1"/>
+              </p:cNvSpPr>
+              <p:nvPr/>
+            </p:nvSpPr>
+            <p:spPr>
+              <a:xfrm>
+                <a:off x="5607170" y="728458"/>
+                <a:ext cx="296299" cy="276999"/>
+              </a:xfrm>
+              <a:prstGeom prst="rect">
+                <a:avLst/>
+              </a:prstGeom>
+              <a:blipFill>
+                <a:blip r:embed="rId9"/>
+                <a:stretch>
+                  <a:fillRect/>
+                </a:stretch>
+              </a:blipFill>
+            </p:spPr>
+            <p:txBody>
+              <a:bodyPr/>
+              <a:lstStyle/>
+              <a:p>
+                <a:r>
+                  <a:rPr lang="en-US">
+                    <a:noFill/>
+                  </a:rPr>
+                  <a:t> </a:t>
+                </a:r>
+              </a:p>
+            </p:txBody>
+          </p:sp>
+        </mc:Fallback>
+      </mc:AlternateContent>
+      <p:sp>
+        <p:nvSpPr>
+          <p:cNvPr id="42" name="Freeform: Shape 41">
+            <a:extLst>
+              <a:ext uri="{FF2B5EF4-FFF2-40B4-BE49-F238E27FC236}">
+                <a16:creationId xmlns:a16="http://schemas.microsoft.com/office/drawing/2014/main" id="{EBCD764E-5D17-4857-AA26-12080E2D3150}"/>
+              </a:ext>
+            </a:extLst>
+          </p:cNvPr>
+          <p:cNvSpPr/>
+          <p:nvPr/>
+        </p:nvSpPr>
+        <p:spPr>
+          <a:xfrm>
+            <a:off x="5883215" y="1440611"/>
+            <a:ext cx="1337094" cy="888521"/>
+          </a:xfrm>
+          <a:custGeom>
+            <a:avLst/>
+            <a:gdLst>
+              <a:gd name="connsiteX0" fmla="*/ 0 w 1337094"/>
+              <a:gd name="connsiteY0" fmla="*/ 888521 h 888521"/>
+              <a:gd name="connsiteX1" fmla="*/ 276045 w 1337094"/>
+              <a:gd name="connsiteY1" fmla="*/ 284672 h 888521"/>
+              <a:gd name="connsiteX2" fmla="*/ 776377 w 1337094"/>
+              <a:gd name="connsiteY2" fmla="*/ 34506 h 888521"/>
+              <a:gd name="connsiteX3" fmla="*/ 1337094 w 1337094"/>
+              <a:gd name="connsiteY3" fmla="*/ 0 h 888521"/>
+            </a:gdLst>
+            <a:ahLst/>
+            <a:cxnLst>
+              <a:cxn ang="0">
+                <a:pos x="connsiteX0" y="connsiteY0"/>
+              </a:cxn>
+              <a:cxn ang="0">
+                <a:pos x="connsiteX1" y="connsiteY1"/>
+              </a:cxn>
+              <a:cxn ang="0">
+                <a:pos x="connsiteX2" y="connsiteY2"/>
+              </a:cxn>
+              <a:cxn ang="0">
+                <a:pos x="connsiteX3" y="connsiteY3"/>
+              </a:cxn>
+            </a:cxnLst>
+            <a:rect l="l" t="t" r="r" b="b"/>
+            <a:pathLst>
+              <a:path w="1337094" h="888521">
+                <a:moveTo>
+                  <a:pt x="0" y="888521"/>
+                </a:moveTo>
+                <a:cubicBezTo>
+                  <a:pt x="73324" y="657764"/>
+                  <a:pt x="146649" y="427008"/>
+                  <a:pt x="276045" y="284672"/>
+                </a:cubicBezTo>
+                <a:cubicBezTo>
+                  <a:pt x="405441" y="142336"/>
+                  <a:pt x="599536" y="81951"/>
+                  <a:pt x="776377" y="34506"/>
+                </a:cubicBezTo>
+                <a:cubicBezTo>
+                  <a:pt x="953219" y="-12939"/>
+                  <a:pt x="1229264" y="5751"/>
+                  <a:pt x="1337094" y="0"/>
+                </a:cubicBezTo>
+              </a:path>
+            </a:pathLst>
+          </a:custGeom>
+          <a:ln w="12700"/>
+        </p:spPr>
+        <p:style>
+          <a:lnRef idx="1">
+            <a:schemeClr val="dk1"/>
+          </a:lnRef>
+          <a:fillRef idx="0">
+            <a:schemeClr val="dk1"/>
+          </a:fillRef>
+          <a:effectRef idx="0">
+            <a:schemeClr val="dk1"/>
+          </a:effectRef>
+          <a:fontRef idx="minor">
+            <a:schemeClr val="tx1"/>
+          </a:fontRef>
+        </p:style>
+        <p:txBody>
+          <a:bodyPr rtlCol="0" anchor="ctr"/>
+          <a:lstStyle/>
+          <a:p>
+            <a:pPr algn="ctr"/>
+            <a:endParaRPr lang="en-US"/>
+          </a:p>
+        </p:txBody>
+      </p:sp>
+      <p:cxnSp>
+        <p:nvCxnSpPr>
+          <p:cNvPr id="55" name="Straight Connector 54">
+            <a:extLst>
+              <a:ext uri="{FF2B5EF4-FFF2-40B4-BE49-F238E27FC236}">
+                <a16:creationId xmlns:a16="http://schemas.microsoft.com/office/drawing/2014/main" id="{29005273-F71B-40CF-BC4D-4EE0BBD61237}"/>
+              </a:ext>
+            </a:extLst>
+          </p:cNvPr>
+          <p:cNvCxnSpPr>
+            <a:stCxn id="42" idx="1"/>
+          </p:cNvCxnSpPr>
+          <p:nvPr/>
+        </p:nvCxnSpPr>
+        <p:spPr>
+          <a:xfrm flipH="1" flipV="1">
+            <a:off x="6096000" y="1639019"/>
+            <a:ext cx="63260" cy="86264"/>
+          </a:xfrm>
+          <a:prstGeom prst="line">
+            <a:avLst/>
+          </a:prstGeom>
+          <a:ln w="12700"/>
+        </p:spPr>
+        <p:style>
+          <a:lnRef idx="1">
+            <a:schemeClr val="dk1"/>
+          </a:lnRef>
+          <a:fillRef idx="0">
+            <a:schemeClr val="dk1"/>
+          </a:fillRef>
+          <a:effectRef idx="0">
+            <a:schemeClr val="dk1"/>
+          </a:effectRef>
+          <a:fontRef idx="minor">
+            <a:schemeClr val="tx1"/>
+          </a:fontRef>
+        </p:style>
+      </p:cxnSp>
+      <p:cxnSp>
+        <p:nvCxnSpPr>
+          <p:cNvPr id="59" name="Straight Connector 58">
+            <a:extLst>
+              <a:ext uri="{FF2B5EF4-FFF2-40B4-BE49-F238E27FC236}">
+                <a16:creationId xmlns:a16="http://schemas.microsoft.com/office/drawing/2014/main" id="{F6FDF9A9-61CE-4B8A-8504-8AE8EFF3C076}"/>
+              </a:ext>
+            </a:extLst>
+          </p:cNvPr>
+          <p:cNvCxnSpPr>
+            <a:cxnSpLocks/>
+            <a:stCxn id="42" idx="2"/>
+          </p:cNvCxnSpPr>
+          <p:nvPr/>
+        </p:nvCxnSpPr>
+        <p:spPr>
+          <a:xfrm flipH="1" flipV="1">
+            <a:off x="6581955" y="1380226"/>
+            <a:ext cx="77637" cy="94891"/>
+          </a:xfrm>
+          <a:prstGeom prst="line">
+            <a:avLst/>
+          </a:prstGeom>
+          <a:ln w="12700"/>
+        </p:spPr>
+        <p:style>
+          <a:lnRef idx="1">
+            <a:schemeClr val="dk1"/>
+          </a:lnRef>
+          <a:fillRef idx="0">
+            <a:schemeClr val="dk1"/>
+          </a:fillRef>
+          <a:effectRef idx="0">
+            <a:schemeClr val="dk1"/>
+          </a:effectRef>
+          <a:fontRef idx="minor">
+            <a:schemeClr val="tx1"/>
+          </a:fontRef>
+        </p:style>
+      </p:cxnSp>
+      <mc:AlternateContent xmlns:mc="http://schemas.openxmlformats.org/markup-compatibility/2006">
+        <mc:Choice xmlns:a14="http://schemas.microsoft.com/office/drawing/2010/main" Requires="a14">
+          <p:sp>
+            <p:nvSpPr>
+              <p:cNvPr id="78" name="TextBox 77">
+                <a:extLst>
+                  <a:ext uri="{FF2B5EF4-FFF2-40B4-BE49-F238E27FC236}">
+                    <a16:creationId xmlns:a16="http://schemas.microsoft.com/office/drawing/2014/main" id="{0928CBEE-FAC0-4720-8145-5178F1CAC5C2}"/>
+                  </a:ext>
+                </a:extLst>
+              </p:cNvPr>
+              <p:cNvSpPr txBox="1"/>
+              <p:nvPr/>
+            </p:nvSpPr>
+            <p:spPr>
+              <a:xfrm>
+                <a:off x="2158600" y="2385204"/>
+                <a:ext cx="476412" cy="276999"/>
+              </a:xfrm>
+              <a:prstGeom prst="rect">
+                <a:avLst/>
+              </a:prstGeom>
+              <a:noFill/>
+            </p:spPr>
+            <p:txBody>
+              <a:bodyPr wrap="none" rtlCol="0">
+                <a:spAutoFit/>
+              </a:bodyPr>
+              <a:lstStyle/>
+              <a:p>
+                <a:pPr/>
+                <a14:m>
+                  <m:oMathPara xmlns:m="http://schemas.openxmlformats.org/officeDocument/2006/math">
+                    <m:oMathParaPr>
+                      <m:jc m:val="centerGroup"/>
+                    </m:oMathParaPr>
+                    <m:oMath xmlns:m="http://schemas.openxmlformats.org/officeDocument/2006/math">
+                      <m:sSub>
+                        <m:sSubPr>
+                          <m:ctrlPr>
+                            <a:rPr lang="en-US" sz="1200" b="0" i="1" smtClean="0">
+                              <a:latin typeface="Cambria Math" panose="02040503050406030204" pitchFamily="18" charset="0"/>
+                            </a:rPr>
+                          </m:ctrlPr>
+                        </m:sSubPr>
+                        <m:e>
+                          <m:r>
+                            <a:rPr lang="en-US" sz="1200" b="0" i="1" smtClean="0">
+                              <a:latin typeface="Cambria Math" panose="02040503050406030204" pitchFamily="18" charset="0"/>
+                            </a:rPr>
+                            <m:t>𝑡</m:t>
+                          </m:r>
+                        </m:e>
+                        <m:sub>
+                          <m:r>
+                            <a:rPr lang="en-US" sz="1200" b="0" i="1" smtClean="0">
+                              <a:latin typeface="Cambria Math" panose="02040503050406030204" pitchFamily="18" charset="0"/>
+                            </a:rPr>
+                            <m:t>𝑖</m:t>
+                          </m:r>
+                          <m:r>
+                            <a:rPr lang="en-US" sz="1200" b="0" i="1" smtClean="0">
+                              <a:latin typeface="Cambria Math" panose="02040503050406030204" pitchFamily="18" charset="0"/>
+                            </a:rPr>
+                            <m:t>−1</m:t>
+                          </m:r>
+                        </m:sub>
+                      </m:sSub>
+                    </m:oMath>
+                  </m:oMathPara>
+                </a14:m>
+                <a:endParaRPr lang="en-US" sz="1200" dirty="0"/>
+              </a:p>
+            </p:txBody>
+          </p:sp>
+        </mc:Choice>
+        <mc:Fallback>
+          <p:sp>
+            <p:nvSpPr>
+              <p:cNvPr id="78" name="TextBox 77">
+                <a:extLst>
+                  <a:ext uri="{FF2B5EF4-FFF2-40B4-BE49-F238E27FC236}">
+                    <a16:creationId xmlns:a16="http://schemas.microsoft.com/office/drawing/2014/main" id="{0928CBEE-FAC0-4720-8145-5178F1CAC5C2}"/>
+                  </a:ext>
+                </a:extLst>
+              </p:cNvPr>
+              <p:cNvSpPr txBox="1">
+                <a:spLocks noRot="1" noChangeAspect="1" noMove="1" noResize="1" noEditPoints="1" noAdjustHandles="1" noChangeArrowheads="1" noChangeShapeType="1" noTextEdit="1"/>
+              </p:cNvSpPr>
+              <p:nvPr/>
+            </p:nvSpPr>
+            <p:spPr>
+              <a:xfrm>
+                <a:off x="2158600" y="2385204"/>
+                <a:ext cx="476412" cy="276999"/>
+              </a:xfrm>
+              <a:prstGeom prst="rect">
+                <a:avLst/>
+              </a:prstGeom>
+              <a:blipFill>
+                <a:blip r:embed="rId10"/>
+                <a:stretch>
+                  <a:fillRect/>
+                </a:stretch>
+              </a:blipFill>
+            </p:spPr>
+            <p:txBody>
+              <a:bodyPr/>
+              <a:lstStyle/>
+              <a:p>
+                <a:r>
+                  <a:rPr lang="en-US">
+                    <a:noFill/>
+                  </a:rPr>
+                  <a:t> </a:t>
+                </a:r>
+              </a:p>
+            </p:txBody>
+          </p:sp>
+        </mc:Fallback>
+      </mc:AlternateContent>
+      <mc:AlternateContent xmlns:mc="http://schemas.openxmlformats.org/markup-compatibility/2006">
+        <mc:Choice xmlns:a14="http://schemas.microsoft.com/office/drawing/2010/main" Requires="a14">
+          <p:sp>
+            <p:nvSpPr>
+              <p:cNvPr id="85" name="TextBox 84">
+                <a:extLst>
+                  <a:ext uri="{FF2B5EF4-FFF2-40B4-BE49-F238E27FC236}">
+                    <a16:creationId xmlns:a16="http://schemas.microsoft.com/office/drawing/2014/main" id="{4FCC15C2-2A37-4540-A573-CDAF80B785D8}"/>
+                  </a:ext>
+                </a:extLst>
+              </p:cNvPr>
+              <p:cNvSpPr txBox="1"/>
+              <p:nvPr/>
+            </p:nvSpPr>
+            <p:spPr>
+              <a:xfrm>
+                <a:off x="2593513" y="2394957"/>
+                <a:ext cx="328936" cy="276999"/>
+              </a:xfrm>
+              <a:prstGeom prst="rect">
+                <a:avLst/>
+              </a:prstGeom>
+              <a:noFill/>
+            </p:spPr>
+            <p:txBody>
+              <a:bodyPr wrap="none" rtlCol="0">
+                <a:spAutoFit/>
+              </a:bodyPr>
+              <a:lstStyle/>
+              <a:p>
+                <a:pPr/>
+                <a14:m>
+                  <m:oMathPara xmlns:m="http://schemas.openxmlformats.org/officeDocument/2006/math">
+                    <m:oMathParaPr>
+                      <m:jc m:val="centerGroup"/>
+                    </m:oMathParaPr>
+                    <m:oMath xmlns:m="http://schemas.openxmlformats.org/officeDocument/2006/math">
+                      <m:sSub>
+                        <m:sSubPr>
+                          <m:ctrlPr>
+                            <a:rPr lang="en-US" sz="1200" b="0" i="1" smtClean="0">
+                              <a:latin typeface="Cambria Math" panose="02040503050406030204" pitchFamily="18" charset="0"/>
+                            </a:rPr>
+                          </m:ctrlPr>
+                        </m:sSubPr>
+                        <m:e>
+                          <m:r>
+                            <a:rPr lang="en-US" sz="1200" b="0" i="1" smtClean="0">
+                              <a:latin typeface="Cambria Math" panose="02040503050406030204" pitchFamily="18" charset="0"/>
+                            </a:rPr>
+                            <m:t>𝑡</m:t>
+                          </m:r>
+                        </m:e>
+                        <m:sub>
+                          <m:r>
+                            <a:rPr lang="en-US" sz="1200" b="0" i="1" smtClean="0">
+                              <a:latin typeface="Cambria Math" panose="02040503050406030204" pitchFamily="18" charset="0"/>
+                            </a:rPr>
+                            <m:t>𝑖</m:t>
+                          </m:r>
+                        </m:sub>
+                      </m:sSub>
+                    </m:oMath>
+                  </m:oMathPara>
+                </a14:m>
+                <a:endParaRPr lang="en-US" sz="1200" dirty="0"/>
+              </a:p>
+            </p:txBody>
+          </p:sp>
+        </mc:Choice>
+        <mc:Fallback>
+          <p:sp>
+            <p:nvSpPr>
+              <p:cNvPr id="85" name="TextBox 84">
+                <a:extLst>
+                  <a:ext uri="{FF2B5EF4-FFF2-40B4-BE49-F238E27FC236}">
+                    <a16:creationId xmlns:a16="http://schemas.microsoft.com/office/drawing/2014/main" id="{4FCC15C2-2A37-4540-A573-CDAF80B785D8}"/>
+                  </a:ext>
+                </a:extLst>
+              </p:cNvPr>
+              <p:cNvSpPr txBox="1">
+                <a:spLocks noRot="1" noChangeAspect="1" noMove="1" noResize="1" noEditPoints="1" noAdjustHandles="1" noChangeArrowheads="1" noChangeShapeType="1" noTextEdit="1"/>
+              </p:cNvSpPr>
+              <p:nvPr/>
+            </p:nvSpPr>
+            <p:spPr>
+              <a:xfrm>
+                <a:off x="2593513" y="2394957"/>
+                <a:ext cx="328936" cy="276999"/>
+              </a:xfrm>
+              <a:prstGeom prst="rect">
+                <a:avLst/>
+              </a:prstGeom>
+              <a:blipFill>
+                <a:blip r:embed="rId11"/>
+                <a:stretch>
+                  <a:fillRect/>
+                </a:stretch>
+              </a:blipFill>
+            </p:spPr>
+            <p:txBody>
+              <a:bodyPr/>
+              <a:lstStyle/>
+              <a:p>
+                <a:r>
+                  <a:rPr lang="en-US">
+                    <a:noFill/>
+                  </a:rPr>
+                  <a:t> </a:t>
+                </a:r>
+              </a:p>
+            </p:txBody>
+          </p:sp>
+        </mc:Fallback>
+      </mc:AlternateContent>
+      <p:cxnSp>
+        <p:nvCxnSpPr>
+          <p:cNvPr id="87" name="Straight Arrow Connector 86">
+            <a:extLst>
+              <a:ext uri="{FF2B5EF4-FFF2-40B4-BE49-F238E27FC236}">
+                <a16:creationId xmlns:a16="http://schemas.microsoft.com/office/drawing/2014/main" id="{9649FB1D-7243-4597-8E2C-C2B5286A7E9C}"/>
+              </a:ext>
+            </a:extLst>
+          </p:cNvPr>
+          <p:cNvCxnSpPr>
+            <a:cxnSpLocks/>
+            <a:endCxn id="42" idx="1"/>
+          </p:cNvCxnSpPr>
+          <p:nvPr/>
+        </p:nvCxnSpPr>
+        <p:spPr>
+          <a:xfrm flipV="1">
+            <a:off x="5607169" y="1725283"/>
+            <a:ext cx="552091" cy="824604"/>
+          </a:xfrm>
+          <a:prstGeom prst="straightConnector1">
+            <a:avLst/>
+          </a:prstGeom>
+          <a:ln>
+            <a:tailEnd type="triangle"/>
+          </a:ln>
+        </p:spPr>
+        <p:style>
+          <a:lnRef idx="1">
+            <a:schemeClr val="dk1"/>
+          </a:lnRef>
+          <a:fillRef idx="0">
+            <a:schemeClr val="dk1"/>
+          </a:fillRef>
+          <a:effectRef idx="0">
+            <a:schemeClr val="dk1"/>
+          </a:effectRef>
+          <a:fontRef idx="minor">
+            <a:schemeClr val="tx1"/>
+          </a:fontRef>
+        </p:style>
+      </p:cxnSp>
+      <p:cxnSp>
+        <p:nvCxnSpPr>
+          <p:cNvPr id="94" name="Straight Arrow Connector 93">
+            <a:extLst>
+              <a:ext uri="{FF2B5EF4-FFF2-40B4-BE49-F238E27FC236}">
+                <a16:creationId xmlns:a16="http://schemas.microsoft.com/office/drawing/2014/main" id="{C7608BB1-FB29-4083-9980-CBE1E17A76AB}"/>
+              </a:ext>
+            </a:extLst>
+          </p:cNvPr>
+          <p:cNvCxnSpPr>
+            <a:cxnSpLocks/>
+            <a:endCxn id="42" idx="2"/>
+          </p:cNvCxnSpPr>
+          <p:nvPr/>
+        </p:nvCxnSpPr>
+        <p:spPr>
+          <a:xfrm flipV="1">
+            <a:off x="5607169" y="1475117"/>
+            <a:ext cx="1052423" cy="1074770"/>
+          </a:xfrm>
+          <a:prstGeom prst="straightConnector1">
+            <a:avLst/>
+          </a:prstGeom>
+          <a:ln>
+            <a:tailEnd type="triangle"/>
+          </a:ln>
+        </p:spPr>
+        <p:style>
+          <a:lnRef idx="1">
+            <a:schemeClr val="dk1"/>
+          </a:lnRef>
+          <a:fillRef idx="0">
+            <a:schemeClr val="dk1"/>
+          </a:fillRef>
+          <a:effectRef idx="0">
+            <a:schemeClr val="dk1"/>
+          </a:effectRef>
+          <a:fontRef idx="minor">
+            <a:schemeClr val="tx1"/>
+          </a:fontRef>
+        </p:style>
+      </p:cxnSp>
+      <p:cxnSp>
+        <p:nvCxnSpPr>
+          <p:cNvPr id="96" name="Straight Arrow Connector 95">
+            <a:extLst>
+              <a:ext uri="{FF2B5EF4-FFF2-40B4-BE49-F238E27FC236}">
+                <a16:creationId xmlns:a16="http://schemas.microsoft.com/office/drawing/2014/main" id="{56DE5AB7-B3A3-497E-9284-1AE20AEF9C0C}"/>
+              </a:ext>
+            </a:extLst>
+          </p:cNvPr>
+          <p:cNvCxnSpPr>
+            <a:cxnSpLocks/>
+            <a:stCxn id="42" idx="1"/>
+            <a:endCxn id="42" idx="2"/>
+          </p:cNvCxnSpPr>
+          <p:nvPr/>
+        </p:nvCxnSpPr>
+        <p:spPr>
+          <a:xfrm flipV="1">
+            <a:off x="6159260" y="1475117"/>
+            <a:ext cx="500332" cy="250166"/>
+          </a:xfrm>
+          <a:prstGeom prst="straightConnector1">
+            <a:avLst/>
+          </a:prstGeom>
+          <a:ln>
+            <a:tailEnd type="triangle"/>
+          </a:ln>
+        </p:spPr>
+        <p:style>
+          <a:lnRef idx="2">
+            <a:schemeClr val="accent1"/>
+          </a:lnRef>
+          <a:fillRef idx="0">
+            <a:schemeClr val="accent1"/>
+          </a:fillRef>
+          <a:effectRef idx="1">
+            <a:schemeClr val="accent1"/>
+          </a:effectRef>
+          <a:fontRef idx="minor">
+            <a:schemeClr val="tx1"/>
+          </a:fontRef>
+        </p:style>
+      </p:cxnSp>
+      <p:cxnSp>
+        <p:nvCxnSpPr>
+          <p:cNvPr id="103" name="Straight Connector 102">
+            <a:extLst>
+              <a:ext uri="{FF2B5EF4-FFF2-40B4-BE49-F238E27FC236}">
+                <a16:creationId xmlns:a16="http://schemas.microsoft.com/office/drawing/2014/main" id="{F633FC40-46F6-4BFE-88BC-A3E84F709448}"/>
+              </a:ext>
+            </a:extLst>
+          </p:cNvPr>
+          <p:cNvCxnSpPr>
+            <a:cxnSpLocks/>
+          </p:cNvCxnSpPr>
+          <p:nvPr/>
+        </p:nvCxnSpPr>
+        <p:spPr>
+          <a:xfrm>
+            <a:off x="2295065" y="2424023"/>
+            <a:ext cx="445662" cy="0"/>
+          </a:xfrm>
+          <a:prstGeom prst="line">
+            <a:avLst/>
+          </a:prstGeom>
+        </p:spPr>
+        <p:style>
+          <a:lnRef idx="3">
+            <a:schemeClr val="accent1"/>
+          </a:lnRef>
+          <a:fillRef idx="0">
+            <a:schemeClr val="accent1"/>
+          </a:fillRef>
+          <a:effectRef idx="2">
+            <a:schemeClr val="accent1"/>
+          </a:effectRef>
+          <a:fontRef idx="minor">
+            <a:schemeClr val="tx1"/>
+          </a:fontRef>
+        </p:style>
+      </p:cxnSp>
+      <mc:AlternateContent xmlns:mc="http://schemas.openxmlformats.org/markup-compatibility/2006">
+        <mc:Choice xmlns:a14="http://schemas.microsoft.com/office/drawing/2010/main" Requires="a14">
+          <p:sp>
+            <p:nvSpPr>
+              <p:cNvPr id="110" name="TextBox 109">
+                <a:extLst>
+                  <a:ext uri="{FF2B5EF4-FFF2-40B4-BE49-F238E27FC236}">
+                    <a16:creationId xmlns:a16="http://schemas.microsoft.com/office/drawing/2014/main" id="{A1882EE4-2C07-440D-9C6E-C5825B151DE8}"/>
+                  </a:ext>
+                </a:extLst>
+              </p:cNvPr>
+              <p:cNvSpPr txBox="1"/>
+              <p:nvPr/>
+            </p:nvSpPr>
+            <p:spPr>
+              <a:xfrm>
+                <a:off x="5529426" y="1543651"/>
+                <a:ext cx="681790" cy="276999"/>
+              </a:xfrm>
+              <a:prstGeom prst="rect">
+                <a:avLst/>
+              </a:prstGeom>
+              <a:noFill/>
+            </p:spPr>
+            <p:txBody>
+              <a:bodyPr wrap="none" rtlCol="0">
+                <a:spAutoFit/>
+              </a:bodyPr>
+              <a:lstStyle/>
+              <a:p>
+                <a:pPr/>
+                <a14:m>
+                  <m:oMathPara xmlns:m="http://schemas.openxmlformats.org/officeDocument/2006/math">
+                    <m:oMathParaPr>
+                      <m:jc m:val="centerGroup"/>
+                    </m:oMathParaPr>
+                    <m:oMath xmlns:m="http://schemas.openxmlformats.org/officeDocument/2006/math">
+                      <m:acc>
+                        <m:accPr>
+                          <m:chr m:val="⃗"/>
+                          <m:ctrlPr>
+                            <a:rPr lang="en-US" sz="1200" b="0" i="1" smtClean="0">
+                              <a:latin typeface="Cambria Math" panose="02040503050406030204" pitchFamily="18" charset="0"/>
+                            </a:rPr>
+                          </m:ctrlPr>
+                        </m:accPr>
+                        <m:e>
+                          <m:r>
+                            <a:rPr lang="en-US" sz="1200" b="0" i="1" smtClean="0">
+                              <a:latin typeface="Cambria Math" panose="02040503050406030204" pitchFamily="18" charset="0"/>
+                            </a:rPr>
+                            <m:t>𝑟</m:t>
+                          </m:r>
+                        </m:e>
+                      </m:acc>
+                      <m:r>
+                        <a:rPr lang="en-US" sz="1200" b="0" i="1" smtClean="0">
+                          <a:latin typeface="Cambria Math" panose="02040503050406030204" pitchFamily="18" charset="0"/>
+                        </a:rPr>
+                        <m:t>(</m:t>
+                      </m:r>
+                      <m:sSub>
+                        <m:sSubPr>
+                          <m:ctrlPr>
+                            <a:rPr lang="en-US" sz="1200" b="0" i="1" smtClean="0">
+                              <a:latin typeface="Cambria Math" panose="02040503050406030204" pitchFamily="18" charset="0"/>
+                            </a:rPr>
+                          </m:ctrlPr>
+                        </m:sSubPr>
+                        <m:e>
+                          <m:r>
+                            <a:rPr lang="en-US" sz="1200" b="0" i="1" smtClean="0">
+                              <a:latin typeface="Cambria Math" panose="02040503050406030204" pitchFamily="18" charset="0"/>
+                            </a:rPr>
+                            <m:t>𝑡</m:t>
+                          </m:r>
+                        </m:e>
+                        <m:sub>
+                          <m:r>
+                            <a:rPr lang="en-US" sz="1200" b="0" i="1" smtClean="0">
+                              <a:latin typeface="Cambria Math" panose="02040503050406030204" pitchFamily="18" charset="0"/>
+                            </a:rPr>
+                            <m:t>𝑖</m:t>
+                          </m:r>
+                          <m:r>
+                            <a:rPr lang="en-US" sz="1200" b="0" i="1" smtClean="0">
+                              <a:latin typeface="Cambria Math" panose="02040503050406030204" pitchFamily="18" charset="0"/>
+                            </a:rPr>
+                            <m:t>−1</m:t>
+                          </m:r>
+                        </m:sub>
+                      </m:sSub>
+                      <m:r>
+                        <a:rPr lang="en-US" sz="1200" b="0" i="1" smtClean="0">
+                          <a:latin typeface="Cambria Math" panose="02040503050406030204" pitchFamily="18" charset="0"/>
+                        </a:rPr>
+                        <m:t>)</m:t>
+                      </m:r>
+                    </m:oMath>
+                  </m:oMathPara>
+                </a14:m>
+                <a:endParaRPr lang="en-US" sz="1200" dirty="0"/>
+              </a:p>
+            </p:txBody>
+          </p:sp>
+        </mc:Choice>
+        <mc:Fallback>
+          <p:sp>
+            <p:nvSpPr>
+              <p:cNvPr id="110" name="TextBox 109">
+                <a:extLst>
+                  <a:ext uri="{FF2B5EF4-FFF2-40B4-BE49-F238E27FC236}">
+                    <a16:creationId xmlns:a16="http://schemas.microsoft.com/office/drawing/2014/main" id="{A1882EE4-2C07-440D-9C6E-C5825B151DE8}"/>
+                  </a:ext>
+                </a:extLst>
+              </p:cNvPr>
+              <p:cNvSpPr txBox="1">
+                <a:spLocks noRot="1" noChangeAspect="1" noMove="1" noResize="1" noEditPoints="1" noAdjustHandles="1" noChangeArrowheads="1" noChangeShapeType="1" noTextEdit="1"/>
+              </p:cNvSpPr>
+              <p:nvPr/>
+            </p:nvSpPr>
+            <p:spPr>
+              <a:xfrm>
+                <a:off x="5529426" y="1543651"/>
+                <a:ext cx="681790" cy="276999"/>
+              </a:xfrm>
+              <a:prstGeom prst="rect">
+                <a:avLst/>
+              </a:prstGeom>
+              <a:blipFill>
+                <a:blip r:embed="rId12"/>
+                <a:stretch>
+                  <a:fillRect t="-2174" b="-6522"/>
+                </a:stretch>
+              </a:blipFill>
+            </p:spPr>
+            <p:txBody>
+              <a:bodyPr/>
+              <a:lstStyle/>
+              <a:p>
+                <a:r>
+                  <a:rPr lang="en-US">
+                    <a:noFill/>
+                  </a:rPr>
+                  <a:t> </a:t>
+                </a:r>
+              </a:p>
+            </p:txBody>
+          </p:sp>
+        </mc:Fallback>
+      </mc:AlternateContent>
+      <mc:AlternateContent xmlns:mc="http://schemas.openxmlformats.org/markup-compatibility/2006">
+        <mc:Choice xmlns:a14="http://schemas.microsoft.com/office/drawing/2010/main" Requires="a14">
+          <p:sp>
+            <p:nvSpPr>
+              <p:cNvPr id="111" name="TextBox 110">
+                <a:extLst>
+                  <a:ext uri="{FF2B5EF4-FFF2-40B4-BE49-F238E27FC236}">
+                    <a16:creationId xmlns:a16="http://schemas.microsoft.com/office/drawing/2014/main" id="{9A2864EB-CC98-48F5-ABC4-040A323F8537}"/>
+                  </a:ext>
+                </a:extLst>
+              </p:cNvPr>
+              <p:cNvSpPr txBox="1"/>
+              <p:nvPr/>
+            </p:nvSpPr>
+            <p:spPr>
+              <a:xfrm>
+                <a:off x="6593198" y="1187487"/>
+                <a:ext cx="534313" cy="276999"/>
+              </a:xfrm>
+              <a:prstGeom prst="rect">
+                <a:avLst/>
+              </a:prstGeom>
+              <a:noFill/>
+            </p:spPr>
+            <p:txBody>
+              <a:bodyPr wrap="none" rtlCol="0">
+                <a:spAutoFit/>
+              </a:bodyPr>
+              <a:lstStyle/>
+              <a:p>
+                <a:pPr/>
+                <a14:m>
+                  <m:oMathPara xmlns:m="http://schemas.openxmlformats.org/officeDocument/2006/math">
+                    <m:oMathParaPr>
+                      <m:jc m:val="centerGroup"/>
+                    </m:oMathParaPr>
+                    <m:oMath xmlns:m="http://schemas.openxmlformats.org/officeDocument/2006/math">
+                      <m:acc>
+                        <m:accPr>
+                          <m:chr m:val="⃗"/>
+                          <m:ctrlPr>
+                            <a:rPr lang="en-US" sz="1200" b="0" i="1" smtClean="0">
+                              <a:latin typeface="Cambria Math" panose="02040503050406030204" pitchFamily="18" charset="0"/>
+                            </a:rPr>
+                          </m:ctrlPr>
+                        </m:accPr>
+                        <m:e>
+                          <m:r>
+                            <a:rPr lang="en-US" sz="1200" b="0" i="1" smtClean="0">
+                              <a:latin typeface="Cambria Math" panose="02040503050406030204" pitchFamily="18" charset="0"/>
+                            </a:rPr>
+                            <m:t>𝑟</m:t>
+                          </m:r>
+                        </m:e>
+                      </m:acc>
+                      <m:r>
+                        <a:rPr lang="en-US" sz="1200" b="0" i="1" smtClean="0">
+                          <a:latin typeface="Cambria Math" panose="02040503050406030204" pitchFamily="18" charset="0"/>
+                        </a:rPr>
+                        <m:t>(</m:t>
+                      </m:r>
+                      <m:sSub>
+                        <m:sSubPr>
+                          <m:ctrlPr>
+                            <a:rPr lang="en-US" sz="1200" b="0" i="1" smtClean="0">
+                              <a:latin typeface="Cambria Math" panose="02040503050406030204" pitchFamily="18" charset="0"/>
+                            </a:rPr>
+                          </m:ctrlPr>
+                        </m:sSubPr>
+                        <m:e>
+                          <m:r>
+                            <a:rPr lang="en-US" sz="1200" b="0" i="1" smtClean="0">
+                              <a:latin typeface="Cambria Math" panose="02040503050406030204" pitchFamily="18" charset="0"/>
+                            </a:rPr>
+                            <m:t>𝑡</m:t>
+                          </m:r>
+                        </m:e>
+                        <m:sub>
+                          <m:r>
+                            <a:rPr lang="en-US" sz="1200" b="0" i="1" smtClean="0">
+                              <a:latin typeface="Cambria Math" panose="02040503050406030204" pitchFamily="18" charset="0"/>
+                            </a:rPr>
+                            <m:t>𝑖</m:t>
+                          </m:r>
+                        </m:sub>
+                      </m:sSub>
+                      <m:r>
+                        <a:rPr lang="en-US" sz="1200" b="0" i="1" smtClean="0">
+                          <a:latin typeface="Cambria Math" panose="02040503050406030204" pitchFamily="18" charset="0"/>
+                        </a:rPr>
+                        <m:t>)</m:t>
+                      </m:r>
+                    </m:oMath>
+                  </m:oMathPara>
+                </a14:m>
+                <a:endParaRPr lang="en-US" sz="1200" dirty="0"/>
+              </a:p>
+            </p:txBody>
+          </p:sp>
+        </mc:Choice>
+        <mc:Fallback>
+          <p:sp>
+            <p:nvSpPr>
+              <p:cNvPr id="111" name="TextBox 110">
+                <a:extLst>
+                  <a:ext uri="{FF2B5EF4-FFF2-40B4-BE49-F238E27FC236}">
+                    <a16:creationId xmlns:a16="http://schemas.microsoft.com/office/drawing/2014/main" id="{9A2864EB-CC98-48F5-ABC4-040A323F8537}"/>
+                  </a:ext>
+                </a:extLst>
+              </p:cNvPr>
+              <p:cNvSpPr txBox="1">
+                <a:spLocks noRot="1" noChangeAspect="1" noMove="1" noResize="1" noEditPoints="1" noAdjustHandles="1" noChangeArrowheads="1" noChangeShapeType="1" noTextEdit="1"/>
+              </p:cNvSpPr>
+              <p:nvPr/>
+            </p:nvSpPr>
+            <p:spPr>
+              <a:xfrm>
+                <a:off x="6593198" y="1187487"/>
+                <a:ext cx="534313" cy="276999"/>
+              </a:xfrm>
+              <a:prstGeom prst="rect">
+                <a:avLst/>
+              </a:prstGeom>
+              <a:blipFill>
+                <a:blip r:embed="rId13"/>
+                <a:stretch>
+                  <a:fillRect t="-2222" b="-8889"/>
+                </a:stretch>
+              </a:blipFill>
+            </p:spPr>
+            <p:txBody>
+              <a:bodyPr/>
+              <a:lstStyle/>
+              <a:p>
+                <a:r>
+                  <a:rPr lang="en-US">
+                    <a:noFill/>
+                  </a:rPr>
+                  <a:t> </a:t>
+                </a:r>
+              </a:p>
+            </p:txBody>
+          </p:sp>
+        </mc:Fallback>
+      </mc:AlternateContent>
+    </p:spTree>
+    <p:extLst>
+      <p:ext uri="{BB962C8B-B14F-4D97-AF65-F5344CB8AC3E}">
+        <p14:creationId xmlns:p14="http://schemas.microsoft.com/office/powerpoint/2010/main" val="3128246731"/>
+      </p:ext>
+    </p:extLst>
+  </p:cSld>
+  <p:clrMapOvr>
+    <a:masterClrMapping/>
+  </p:clrMapOvr>
+</p:sld>
+</file>
+
+<file path=ppt/slides/slide3.xml><?xml version="1.0" encoding="utf-8"?>
 <p:sld xmlns:a="http://schemas.openxmlformats.org/drawingml/2006/main" xmlns:r="http://schemas.openxmlformats.org/officeDocument/2006/relationships" xmlns:p="http://schemas.openxmlformats.org/presentationml/2006/main">
   <p:cSld>
     <p:spTree>
@@ -7386,7 +9258,7 @@
 </p:sld>
 </file>
 
-<file path=ppt/slides/slide3.xml><?xml version="1.0" encoding="utf-8"?>
+<file path=ppt/slides/slide4.xml><?xml version="1.0" encoding="utf-8"?>
 <p:sld xmlns:a="http://schemas.openxmlformats.org/drawingml/2006/main" xmlns:r="http://schemas.openxmlformats.org/officeDocument/2006/relationships" xmlns:p="http://schemas.openxmlformats.org/presentationml/2006/main">
   <p:cSld>
     <p:spTree>
@@ -7480,8 +9352,8 @@
           </a:fontRef>
         </p:style>
       </p:cxnSp>
-      <mc:AlternateContent xmlns:mc="http://schemas.openxmlformats.org/markup-compatibility/2006">
-        <mc:Choice xmlns:a14="http://schemas.microsoft.com/office/drawing/2010/main" Requires="a14">
+      <mc:AlternateContent xmlns:mc="http://schemas.openxmlformats.org/markup-compatibility/2006" xmlns:a14="http://schemas.microsoft.com/office/drawing/2010/main">
+        <mc:Choice Requires="a14">
           <p:sp>
             <p:nvSpPr>
               <p:cNvPr id="8" name="TextBox 7">
@@ -7510,6 +9382,7 @@
               </a:bodyPr>
               <a:lstStyle/>
               <a:p>
+                <a:pPr/>
                 <a14:m>
                   <m:oMathPara xmlns:m="http://schemas.openxmlformats.org/officeDocument/2006/math">
                     <m:oMathParaPr>
@@ -7542,7 +9415,7 @@
             </p:txBody>
           </p:sp>
         </mc:Choice>
-        <mc:Fallback>
+        <mc:Fallback xmlns="">
           <p:sp>
             <p:nvSpPr>
               <p:cNvPr id="8" name="TextBox 7">
@@ -7628,8 +9501,8 @@
           </a:fontRef>
         </p:style>
       </p:cxnSp>
-      <mc:AlternateContent xmlns:mc="http://schemas.openxmlformats.org/markup-compatibility/2006">
-        <mc:Choice xmlns:a14="http://schemas.microsoft.com/office/drawing/2010/main" Requires="a14">
+      <mc:AlternateContent xmlns:mc="http://schemas.openxmlformats.org/markup-compatibility/2006" xmlns:a14="http://schemas.microsoft.com/office/drawing/2010/main">
+        <mc:Choice Requires="a14">
           <p:sp>
             <p:nvSpPr>
               <p:cNvPr id="13" name="TextBox 12">
@@ -7658,6 +9531,7 @@
               </a:bodyPr>
               <a:lstStyle/>
               <a:p>
+                <a:pPr/>
                 <a14:m>
                   <m:oMathPara xmlns:m="http://schemas.openxmlformats.org/officeDocument/2006/math">
                     <m:oMathParaPr>
@@ -7690,7 +9564,7 @@
             </p:txBody>
           </p:sp>
         </mc:Choice>
-        <mc:Fallback>
+        <mc:Fallback xmlns="">
           <p:sp>
             <p:nvSpPr>
               <p:cNvPr id="13" name="TextBox 12">

</xml_diff>